<commit_message>
expiration mot de passe
</commit_message>
<xml_diff>
--- a/doc/présentation V3.pptx
+++ b/doc/présentation V3.pptx
@@ -286,7 +286,7 @@
           <a:p>
             <a:fld id="{AA70F276-1833-4A75-9C1D-A56E2295A68D}" type="datetimeFigureOut">
               <a:rPr lang="en-US" smtClean="0"/>
-              <a:t>11/8/2022</a:t>
+              <a:t>11/9/2022</a:t>
             </a:fld>
             <a:endParaRPr lang="en-US"/>
           </a:p>
@@ -484,7 +484,7 @@
           <a:p>
             <a:fld id="{AA70F276-1833-4A75-9C1D-A56E2295A68D}" type="datetimeFigureOut">
               <a:rPr lang="en-US" smtClean="0"/>
-              <a:t>11/8/2022</a:t>
+              <a:t>11/9/2022</a:t>
             </a:fld>
             <a:endParaRPr lang="en-US"/>
           </a:p>
@@ -692,7 +692,7 @@
           <a:p>
             <a:fld id="{AA70F276-1833-4A75-9C1D-A56E2295A68D}" type="datetimeFigureOut">
               <a:rPr lang="en-US" smtClean="0"/>
-              <a:t>11/8/2022</a:t>
+              <a:t>11/9/2022</a:t>
             </a:fld>
             <a:endParaRPr lang="en-US"/>
           </a:p>
@@ -917,7 +917,7 @@
           <a:p>
             <a:fld id="{AA70F276-1833-4A75-9C1D-A56E2295A68D}" type="datetimeFigureOut">
               <a:rPr lang="en-US" smtClean="0"/>
-              <a:t>11/8/2022</a:t>
+              <a:t>11/9/2022</a:t>
             </a:fld>
             <a:endParaRPr lang="en-US"/>
           </a:p>
@@ -1193,7 +1193,7 @@
           <a:p>
             <a:fld id="{AA70F276-1833-4A75-9C1D-A56E2295A68D}" type="datetimeFigureOut">
               <a:rPr lang="en-US" smtClean="0"/>
-              <a:t>11/8/2022</a:t>
+              <a:t>11/9/2022</a:t>
             </a:fld>
             <a:endParaRPr lang="en-US"/>
           </a:p>
@@ -1463,7 +1463,7 @@
           <a:p>
             <a:fld id="{AA70F276-1833-4A75-9C1D-A56E2295A68D}" type="datetimeFigureOut">
               <a:rPr lang="en-US" smtClean="0"/>
-              <a:t>11/8/2022</a:t>
+              <a:t>11/9/2022</a:t>
             </a:fld>
             <a:endParaRPr lang="en-US"/>
           </a:p>
@@ -1875,7 +1875,7 @@
           <a:p>
             <a:fld id="{AA70F276-1833-4A75-9C1D-A56E2295A68D}" type="datetimeFigureOut">
               <a:rPr lang="en-US" smtClean="0"/>
-              <a:t>11/8/2022</a:t>
+              <a:t>11/9/2022</a:t>
             </a:fld>
             <a:endParaRPr lang="en-US"/>
           </a:p>
@@ -2016,7 +2016,7 @@
           <a:p>
             <a:fld id="{AA70F276-1833-4A75-9C1D-A56E2295A68D}" type="datetimeFigureOut">
               <a:rPr lang="en-US" smtClean="0"/>
-              <a:t>11/8/2022</a:t>
+              <a:t>11/9/2022</a:t>
             </a:fld>
             <a:endParaRPr lang="en-US"/>
           </a:p>
@@ -2129,7 +2129,7 @@
           <a:p>
             <a:fld id="{AA70F276-1833-4A75-9C1D-A56E2295A68D}" type="datetimeFigureOut">
               <a:rPr lang="en-US" smtClean="0"/>
-              <a:t>11/8/2022</a:t>
+              <a:t>11/9/2022</a:t>
             </a:fld>
             <a:endParaRPr lang="en-US"/>
           </a:p>
@@ -2440,7 +2440,7 @@
           <a:p>
             <a:fld id="{AA70F276-1833-4A75-9C1D-A56E2295A68D}" type="datetimeFigureOut">
               <a:rPr lang="en-US" smtClean="0"/>
-              <a:t>11/8/2022</a:t>
+              <a:t>11/9/2022</a:t>
             </a:fld>
             <a:endParaRPr lang="en-US"/>
           </a:p>
@@ -2731,7 +2731,7 @@
           <a:p>
             <a:fld id="{AA70F276-1833-4A75-9C1D-A56E2295A68D}" type="datetimeFigureOut">
               <a:rPr lang="en-US" smtClean="0"/>
-              <a:t>11/8/2022</a:t>
+              <a:t>11/9/2022</a:t>
             </a:fld>
             <a:endParaRPr lang="en-US"/>
           </a:p>
@@ -3039,7 +3039,7 @@
             <a:fld id="{AA70F276-1833-4A75-9C1D-A56E2295A68D}" type="datetimeFigureOut">
               <a:rPr lang="en-US" smtClean="0"/>
               <a:pPr/>
-              <a:t>11/8/2022</a:t>
+              <a:t>11/9/2022</a:t>
             </a:fld>
             <a:endParaRPr lang="en-US" dirty="0"/>
           </a:p>
@@ -7374,10 +7374,10 @@
         </p:nvGrpSpPr>
         <p:grpSpPr>
           <a:xfrm>
-            <a:off x="2679250" y="1884696"/>
-            <a:ext cx="4230950" cy="1003104"/>
+            <a:off x="2726938" y="1647729"/>
+            <a:ext cx="3891927" cy="1003104"/>
             <a:chOff x="751987" y="1588004"/>
-            <a:chExt cx="4230950" cy="1003104"/>
+            <a:chExt cx="3845332" cy="1003104"/>
           </a:xfrm>
         </p:grpSpPr>
         <p:pic>
@@ -7425,7 +7425,7 @@
           <p:spPr>
             <a:xfrm>
               <a:off x="751987" y="2078147"/>
-              <a:ext cx="4230950" cy="512961"/>
+              <a:ext cx="3577295" cy="512961"/>
             </a:xfrm>
             <a:prstGeom prst="rect">
               <a:avLst/>
@@ -7552,7 +7552,7 @@
         </p:nvSpPr>
         <p:spPr>
           <a:xfrm>
-            <a:off x="8898912" y="2681834"/>
+            <a:off x="8902695" y="2754601"/>
             <a:ext cx="674672" cy="338554"/>
           </a:xfrm>
           <a:prstGeom prst="rect">
@@ -7587,8 +7587,8 @@
         </p:nvSpPr>
         <p:spPr>
           <a:xfrm rot="333097" flipH="1">
-            <a:off x="7160676" y="1705446"/>
-            <a:ext cx="45719" cy="4324271"/>
+            <a:off x="7108577" y="2779965"/>
+            <a:ext cx="45719" cy="3247226"/>
           </a:xfrm>
           <a:prstGeom prst="flowChartInputOutput">
             <a:avLst/>
@@ -7695,6 +7695,366 @@
           </a:p>
         </p:txBody>
       </p:sp>
+      <p:pic>
+        <p:nvPicPr>
+          <p:cNvPr id="19" name="Image 18">
+            <a:extLst>
+              <a:ext uri="{FF2B5EF4-FFF2-40B4-BE49-F238E27FC236}">
+                <a16:creationId xmlns:a16="http://schemas.microsoft.com/office/drawing/2014/main" id="{54449151-0D32-88A9-33B0-27F3BF390A80}"/>
+              </a:ext>
+            </a:extLst>
+          </p:cNvPr>
+          <p:cNvPicPr>
+            <a:picLocks noChangeAspect="1"/>
+          </p:cNvPicPr>
+          <p:nvPr/>
+        </p:nvPicPr>
+        <p:blipFill>
+          <a:blip r:embed="rId9"/>
+          <a:stretch>
+            <a:fillRect/>
+          </a:stretch>
+        </p:blipFill>
+        <p:spPr>
+          <a:xfrm>
+            <a:off x="7035616" y="1610088"/>
+            <a:ext cx="360000" cy="318263"/>
+          </a:xfrm>
+          <a:prstGeom prst="rect">
+            <a:avLst/>
+          </a:prstGeom>
+        </p:spPr>
+      </p:pic>
+      <p:pic>
+        <p:nvPicPr>
+          <p:cNvPr id="22" name="Image 21">
+            <a:extLst>
+              <a:ext uri="{FF2B5EF4-FFF2-40B4-BE49-F238E27FC236}">
+                <a16:creationId xmlns:a16="http://schemas.microsoft.com/office/drawing/2014/main" id="{9644EFF5-68C5-454C-565C-1C96F0B276B3}"/>
+              </a:ext>
+            </a:extLst>
+          </p:cNvPr>
+          <p:cNvPicPr>
+            <a:picLocks noChangeAspect="1"/>
+          </p:cNvPicPr>
+          <p:nvPr/>
+        </p:nvPicPr>
+        <p:blipFill>
+          <a:blip r:embed="rId10"/>
+          <a:stretch>
+            <a:fillRect/>
+          </a:stretch>
+        </p:blipFill>
+        <p:spPr>
+          <a:xfrm>
+            <a:off x="9921950" y="2120953"/>
+            <a:ext cx="360000" cy="357163"/>
+          </a:xfrm>
+          <a:prstGeom prst="rect">
+            <a:avLst/>
+          </a:prstGeom>
+        </p:spPr>
+      </p:pic>
+      <p:pic>
+        <p:nvPicPr>
+          <p:cNvPr id="24" name="Image 23">
+            <a:extLst>
+              <a:ext uri="{FF2B5EF4-FFF2-40B4-BE49-F238E27FC236}">
+                <a16:creationId xmlns:a16="http://schemas.microsoft.com/office/drawing/2014/main" id="{D0451CF5-31B7-0364-0A86-1680EC2DDD4C}"/>
+              </a:ext>
+            </a:extLst>
+          </p:cNvPr>
+          <p:cNvPicPr>
+            <a:picLocks noChangeAspect="1"/>
+          </p:cNvPicPr>
+          <p:nvPr/>
+        </p:nvPicPr>
+        <p:blipFill>
+          <a:blip r:embed="rId11"/>
+          <a:stretch>
+            <a:fillRect/>
+          </a:stretch>
+        </p:blipFill>
+        <p:spPr>
+          <a:xfrm>
+            <a:off x="8860086" y="2042381"/>
+            <a:ext cx="360000" cy="357212"/>
+          </a:xfrm>
+          <a:prstGeom prst="rect">
+            <a:avLst/>
+          </a:prstGeom>
+        </p:spPr>
+      </p:pic>
+      <p:pic>
+        <p:nvPicPr>
+          <p:cNvPr id="26" name="Image 25">
+            <a:extLst>
+              <a:ext uri="{FF2B5EF4-FFF2-40B4-BE49-F238E27FC236}">
+                <a16:creationId xmlns:a16="http://schemas.microsoft.com/office/drawing/2014/main" id="{5733F2C4-2831-5B08-EB23-A5D6DEE8F730}"/>
+              </a:ext>
+            </a:extLst>
+          </p:cNvPr>
+          <p:cNvPicPr>
+            <a:picLocks noChangeAspect="1"/>
+          </p:cNvPicPr>
+          <p:nvPr/>
+        </p:nvPicPr>
+        <p:blipFill>
+          <a:blip r:embed="rId12"/>
+          <a:stretch>
+            <a:fillRect/>
+          </a:stretch>
+        </p:blipFill>
+        <p:spPr>
+          <a:xfrm>
+            <a:off x="10239275" y="1479948"/>
+            <a:ext cx="360000" cy="352800"/>
+          </a:xfrm>
+          <a:prstGeom prst="rect">
+            <a:avLst/>
+          </a:prstGeom>
+        </p:spPr>
+      </p:pic>
+      <p:pic>
+        <p:nvPicPr>
+          <p:cNvPr id="28" name="Image 27">
+            <a:extLst>
+              <a:ext uri="{FF2B5EF4-FFF2-40B4-BE49-F238E27FC236}">
+                <a16:creationId xmlns:a16="http://schemas.microsoft.com/office/drawing/2014/main" id="{E87398E1-C49E-D047-50E9-CD485F67A245}"/>
+              </a:ext>
+            </a:extLst>
+          </p:cNvPr>
+          <p:cNvPicPr>
+            <a:picLocks noChangeAspect="1"/>
+          </p:cNvPicPr>
+          <p:nvPr/>
+        </p:nvPicPr>
+        <p:blipFill>
+          <a:blip r:embed="rId13"/>
+          <a:stretch>
+            <a:fillRect/>
+          </a:stretch>
+        </p:blipFill>
+        <p:spPr>
+          <a:xfrm>
+            <a:off x="8174731" y="2084455"/>
+            <a:ext cx="360000" cy="354286"/>
+          </a:xfrm>
+          <a:prstGeom prst="rect">
+            <a:avLst/>
+          </a:prstGeom>
+        </p:spPr>
+      </p:pic>
+      <p:pic>
+        <p:nvPicPr>
+          <p:cNvPr id="32" name="Image 31">
+            <a:extLst>
+              <a:ext uri="{FF2B5EF4-FFF2-40B4-BE49-F238E27FC236}">
+                <a16:creationId xmlns:a16="http://schemas.microsoft.com/office/drawing/2014/main" id="{B0DB5D6D-F01F-BFDC-CE99-69096443F866}"/>
+              </a:ext>
+            </a:extLst>
+          </p:cNvPr>
+          <p:cNvPicPr>
+            <a:picLocks noChangeAspect="1"/>
+          </p:cNvPicPr>
+          <p:nvPr/>
+        </p:nvPicPr>
+        <p:blipFill>
+          <a:blip r:embed="rId14"/>
+          <a:stretch>
+            <a:fillRect/>
+          </a:stretch>
+        </p:blipFill>
+        <p:spPr>
+          <a:xfrm>
+            <a:off x="7709016" y="1531460"/>
+            <a:ext cx="360000" cy="360000"/>
+          </a:xfrm>
+          <a:prstGeom prst="rect">
+            <a:avLst/>
+          </a:prstGeom>
+        </p:spPr>
+      </p:pic>
+      <p:pic>
+        <p:nvPicPr>
+          <p:cNvPr id="34" name="Image 33">
+            <a:extLst>
+              <a:ext uri="{FF2B5EF4-FFF2-40B4-BE49-F238E27FC236}">
+                <a16:creationId xmlns:a16="http://schemas.microsoft.com/office/drawing/2014/main" id="{CC5C5637-D954-A880-067C-6D32CE7E8E14}"/>
+              </a:ext>
+            </a:extLst>
+          </p:cNvPr>
+          <p:cNvPicPr>
+            <a:picLocks noChangeAspect="1"/>
+          </p:cNvPicPr>
+          <p:nvPr/>
+        </p:nvPicPr>
+        <p:blipFill>
+          <a:blip r:embed="rId15"/>
+          <a:stretch>
+            <a:fillRect/>
+          </a:stretch>
+        </p:blipFill>
+        <p:spPr>
+          <a:xfrm>
+            <a:off x="9177398" y="1418097"/>
+            <a:ext cx="360000" cy="324275"/>
+          </a:xfrm>
+          <a:prstGeom prst="rect">
+            <a:avLst/>
+          </a:prstGeom>
+        </p:spPr>
+      </p:pic>
+      <p:pic>
+        <p:nvPicPr>
+          <p:cNvPr id="36" name="Image 35">
+            <a:extLst>
+              <a:ext uri="{FF2B5EF4-FFF2-40B4-BE49-F238E27FC236}">
+                <a16:creationId xmlns:a16="http://schemas.microsoft.com/office/drawing/2014/main" id="{54B22005-D45E-AD32-BFD5-302B85DA2A74}"/>
+              </a:ext>
+            </a:extLst>
+          </p:cNvPr>
+          <p:cNvPicPr>
+            <a:picLocks noChangeAspect="1"/>
+          </p:cNvPicPr>
+          <p:nvPr/>
+        </p:nvPicPr>
+        <p:blipFill>
+          <a:blip r:embed="rId16"/>
+          <a:stretch>
+            <a:fillRect/>
+          </a:stretch>
+        </p:blipFill>
+        <p:spPr>
+          <a:xfrm>
+            <a:off x="10430105" y="1912575"/>
+            <a:ext cx="360000" cy="343759"/>
+          </a:xfrm>
+          <a:prstGeom prst="rect">
+            <a:avLst/>
+          </a:prstGeom>
+        </p:spPr>
+      </p:pic>
+      <p:pic>
+        <p:nvPicPr>
+          <p:cNvPr id="38" name="Image 37">
+            <a:extLst>
+              <a:ext uri="{FF2B5EF4-FFF2-40B4-BE49-F238E27FC236}">
+                <a16:creationId xmlns:a16="http://schemas.microsoft.com/office/drawing/2014/main" id="{FFCD5155-FB75-1D0A-76A3-31E9C92FF07D}"/>
+              </a:ext>
+            </a:extLst>
+          </p:cNvPr>
+          <p:cNvPicPr>
+            <a:picLocks noChangeAspect="1"/>
+          </p:cNvPicPr>
+          <p:nvPr/>
+        </p:nvPicPr>
+        <p:blipFill>
+          <a:blip r:embed="rId17"/>
+          <a:stretch>
+            <a:fillRect/>
+          </a:stretch>
+        </p:blipFill>
+        <p:spPr>
+          <a:xfrm>
+            <a:off x="9437991" y="1989925"/>
+            <a:ext cx="360000" cy="404211"/>
+          </a:xfrm>
+          <a:prstGeom prst="rect">
+            <a:avLst/>
+          </a:prstGeom>
+        </p:spPr>
+      </p:pic>
+      <p:pic>
+        <p:nvPicPr>
+          <p:cNvPr id="40" name="Image 39">
+            <a:extLst>
+              <a:ext uri="{FF2B5EF4-FFF2-40B4-BE49-F238E27FC236}">
+                <a16:creationId xmlns:a16="http://schemas.microsoft.com/office/drawing/2014/main" id="{027E0D50-B4AF-5DEC-1D41-87FD7E7AF10A}"/>
+              </a:ext>
+            </a:extLst>
+          </p:cNvPr>
+          <p:cNvPicPr>
+            <a:picLocks noChangeAspect="1"/>
+          </p:cNvPicPr>
+          <p:nvPr/>
+        </p:nvPicPr>
+        <p:blipFill>
+          <a:blip r:embed="rId18"/>
+          <a:stretch>
+            <a:fillRect/>
+          </a:stretch>
+        </p:blipFill>
+        <p:spPr>
+          <a:xfrm>
+            <a:off x="7395061" y="2056494"/>
+            <a:ext cx="360000" cy="360000"/>
+          </a:xfrm>
+          <a:prstGeom prst="rect">
+            <a:avLst/>
+          </a:prstGeom>
+        </p:spPr>
+      </p:pic>
+      <p:pic>
+        <p:nvPicPr>
+          <p:cNvPr id="42" name="Image 41">
+            <a:extLst>
+              <a:ext uri="{FF2B5EF4-FFF2-40B4-BE49-F238E27FC236}">
+                <a16:creationId xmlns:a16="http://schemas.microsoft.com/office/drawing/2014/main" id="{25740042-E070-DC48-52EE-696E6B85206C}"/>
+              </a:ext>
+            </a:extLst>
+          </p:cNvPr>
+          <p:cNvPicPr>
+            <a:picLocks noChangeAspect="1"/>
+          </p:cNvPicPr>
+          <p:nvPr/>
+        </p:nvPicPr>
+        <p:blipFill>
+          <a:blip r:embed="rId19"/>
+          <a:stretch>
+            <a:fillRect/>
+          </a:stretch>
+        </p:blipFill>
+        <p:spPr>
+          <a:xfrm>
+            <a:off x="9728241" y="1589219"/>
+            <a:ext cx="360000" cy="360000"/>
+          </a:xfrm>
+          <a:prstGeom prst="rect">
+            <a:avLst/>
+          </a:prstGeom>
+        </p:spPr>
+      </p:pic>
+      <p:pic>
+        <p:nvPicPr>
+          <p:cNvPr id="44" name="Image 43">
+            <a:extLst>
+              <a:ext uri="{FF2B5EF4-FFF2-40B4-BE49-F238E27FC236}">
+                <a16:creationId xmlns:a16="http://schemas.microsoft.com/office/drawing/2014/main" id="{B2297728-11B8-8CF4-E843-9DAAE6A304BF}"/>
+              </a:ext>
+            </a:extLst>
+          </p:cNvPr>
+          <p:cNvPicPr>
+            <a:picLocks noChangeAspect="1"/>
+          </p:cNvPicPr>
+          <p:nvPr/>
+        </p:nvPicPr>
+        <p:blipFill>
+          <a:blip r:embed="rId20"/>
+          <a:stretch>
+            <a:fillRect/>
+          </a:stretch>
+        </p:blipFill>
+        <p:spPr>
+          <a:xfrm>
+            <a:off x="8503998" y="1559378"/>
+            <a:ext cx="327938" cy="333102"/>
+          </a:xfrm>
+          <a:prstGeom prst="rect">
+            <a:avLst/>
+          </a:prstGeom>
+        </p:spPr>
+      </p:pic>
     </p:spTree>
     <p:extLst>
       <p:ext uri="{BB962C8B-B14F-4D97-AF65-F5344CB8AC3E}">
@@ -9456,9 +9816,9 @@
         <p:grpSpPr>
           <a:xfrm>
             <a:off x="7677632" y="3192877"/>
-            <a:ext cx="2585164" cy="1225749"/>
+            <a:ext cx="2859738" cy="1280549"/>
             <a:chOff x="7677632" y="3192877"/>
-            <a:chExt cx="2585164" cy="1225749"/>
+            <a:chExt cx="2859738" cy="1280549"/>
           </a:xfrm>
         </p:grpSpPr>
         <p:sp>
@@ -9475,8 +9835,8 @@
           </p:nvSpPr>
           <p:spPr>
             <a:xfrm>
-              <a:off x="7891436" y="3273097"/>
-              <a:ext cx="2371360" cy="1015663"/>
+              <a:off x="7891435" y="3273097"/>
+              <a:ext cx="2645935" cy="1200329"/>
             </a:xfrm>
             <a:prstGeom prst="rect">
               <a:avLst/>
@@ -9492,6 +9852,12 @@
               <a:r>
                 <a:rPr lang="fr-FR" sz="1200" dirty="0"/>
                 <a:t>    Suivi des incidents</a:t>
+              </a:r>
+            </a:p>
+            <a:p>
+              <a:r>
+                <a:rPr lang="fr-FR" sz="1200" dirty="0"/>
+                <a:t>   Gestion du mot de passe</a:t>
               </a:r>
             </a:p>
             <a:p>
@@ -9575,10 +9941,10 @@
         </p:nvGrpSpPr>
         <p:grpSpPr>
           <a:xfrm>
-            <a:off x="7677631" y="4479345"/>
-            <a:ext cx="3037717" cy="1445244"/>
+            <a:off x="7695543" y="4574871"/>
+            <a:ext cx="3037717" cy="1260578"/>
             <a:chOff x="1351551" y="4513705"/>
-            <a:chExt cx="3037717" cy="1445244"/>
+            <a:chExt cx="3037717" cy="1260578"/>
           </a:xfrm>
         </p:grpSpPr>
         <p:sp>
@@ -9596,7 +9962,7 @@
           <p:spPr>
             <a:xfrm>
               <a:off x="1565355" y="4573954"/>
-              <a:ext cx="2823913" cy="1384995"/>
+              <a:ext cx="2823913" cy="1200329"/>
             </a:xfrm>
             <a:prstGeom prst="rect">
               <a:avLst/>
@@ -9624,12 +9990,6 @@
               <a:r>
                 <a:rPr lang="fr-FR" sz="1200" dirty="0"/>
                 <a:t>        Types d’incidents</a:t>
-              </a:r>
-            </a:p>
-            <a:p>
-              <a:r>
-                <a:rPr lang="fr-FR" sz="1200" dirty="0"/>
-                <a:t>    Contrôle d’expiration mot de passe</a:t>
               </a:r>
             </a:p>
             <a:p>
@@ -11697,12 +12057,64 @@
           </a:prstGeom>
         </p:spPr>
       </p:pic>
+      <p:sp>
+        <p:nvSpPr>
+          <p:cNvPr id="2" name="Titre 1">
+            <a:extLst>
+              <a:ext uri="{FF2B5EF4-FFF2-40B4-BE49-F238E27FC236}">
+                <a16:creationId xmlns:a16="http://schemas.microsoft.com/office/drawing/2014/main" id="{099E2E77-954A-DD7C-99BF-B9521D1A2115}"/>
+              </a:ext>
+            </a:extLst>
+          </p:cNvPr>
+          <p:cNvSpPr>
+            <a:spLocks noGrp="1"/>
+          </p:cNvSpPr>
+          <p:nvPr>
+            <p:ph type="title"/>
+          </p:nvPr>
+        </p:nvSpPr>
+        <p:spPr>
+          <a:xfrm>
+            <a:off x="904875" y="909854"/>
+            <a:ext cx="3748148" cy="699027"/>
+          </a:xfrm>
+        </p:spPr>
+        <p:txBody>
+          <a:bodyPr vert="horz" lIns="91440" tIns="45720" rIns="91440" bIns="45720" rtlCol="0" anchor="b">
+            <a:normAutofit/>
+          </a:bodyPr>
+          <a:lstStyle/>
+          <a:p>
+            <a:r>
+              <a:rPr lang="en-US" sz="4000" dirty="0">
+                <a:gradFill flip="none" rotWithShape="1">
+                  <a:gsLst>
+                    <a:gs pos="0">
+                      <a:schemeClr val="accent5">
+                        <a:alpha val="70000"/>
+                      </a:schemeClr>
+                    </a:gs>
+                    <a:gs pos="100000">
+                      <a:schemeClr val="accent1">
+                        <a:alpha val="70000"/>
+                      </a:schemeClr>
+                    </a:gs>
+                  </a:gsLst>
+                  <a:lin ang="0" scaled="1"/>
+                  <a:tileRect/>
+                </a:gradFill>
+              </a:rPr>
+              <a:t>Focus front end</a:t>
+            </a:r>
+          </a:p>
+        </p:txBody>
+      </p:sp>
       <p:grpSp>
         <p:nvGrpSpPr>
-          <p:cNvPr id="18" name="Groupe 17">
-            <a:extLst>
-              <a:ext uri="{FF2B5EF4-FFF2-40B4-BE49-F238E27FC236}">
-                <a16:creationId xmlns:a16="http://schemas.microsoft.com/office/drawing/2014/main" id="{CC3561CC-E4C7-A347-B459-EF659B93F8C5}"/>
+          <p:cNvPr id="15" name="Groupe 14">
+            <a:extLst>
+              <a:ext uri="{FF2B5EF4-FFF2-40B4-BE49-F238E27FC236}">
+                <a16:creationId xmlns:a16="http://schemas.microsoft.com/office/drawing/2014/main" id="{04A5A75F-1031-ABA7-EB27-BAC7F79ED41D}"/>
               </a:ext>
             </a:extLst>
           </p:cNvPr>
@@ -11711,12 +12123,42 @@
         </p:nvGrpSpPr>
         <p:grpSpPr>
           <a:xfrm>
-            <a:off x="1467788" y="2927646"/>
-            <a:ext cx="2203241" cy="2134716"/>
-            <a:chOff x="1467788" y="2927646"/>
-            <a:chExt cx="2203241" cy="2134716"/>
+            <a:off x="1426399" y="3048953"/>
+            <a:ext cx="2126280" cy="2302614"/>
+            <a:chOff x="1426399" y="3048953"/>
+            <a:chExt cx="2126280" cy="2302614"/>
           </a:xfrm>
         </p:grpSpPr>
+        <p:pic>
+          <p:nvPicPr>
+            <p:cNvPr id="14" name="Image 13">
+              <a:extLst>
+                <a:ext uri="{FF2B5EF4-FFF2-40B4-BE49-F238E27FC236}">
+                  <a16:creationId xmlns:a16="http://schemas.microsoft.com/office/drawing/2014/main" id="{CFDC3C9B-3D34-E01E-02E5-8F29C011C822}"/>
+                </a:ext>
+              </a:extLst>
+            </p:cNvPr>
+            <p:cNvPicPr>
+              <a:picLocks noChangeAspect="1"/>
+            </p:cNvPicPr>
+            <p:nvPr/>
+          </p:nvPicPr>
+          <p:blipFill>
+            <a:blip r:embed="rId3"/>
+            <a:stretch>
+              <a:fillRect/>
+            </a:stretch>
+          </p:blipFill>
+          <p:spPr>
+            <a:xfrm>
+              <a:off x="1426399" y="4151417"/>
+              <a:ext cx="1028700" cy="1200150"/>
+            </a:xfrm>
+            <a:prstGeom prst="rect">
+              <a:avLst/>
+            </a:prstGeom>
+          </p:spPr>
+        </p:pic>
         <p:cxnSp>
           <p:nvCxnSpPr>
             <p:cNvPr id="13" name="Connecteur droit avec flèche 12">
@@ -11733,8 +12175,8 @@
           </p:nvCxnSpPr>
           <p:spPr>
             <a:xfrm flipH="1">
-              <a:off x="1887293" y="2927646"/>
-              <a:ext cx="1783736" cy="1411223"/>
+              <a:off x="2005218" y="3048953"/>
+              <a:ext cx="1547461" cy="1087356"/>
             </a:xfrm>
             <a:prstGeom prst="straightConnector1">
               <a:avLst/>
@@ -11764,95 +12206,13 @@
             </a:fontRef>
           </p:style>
         </p:cxnSp>
-        <p:pic>
-          <p:nvPicPr>
-            <p:cNvPr id="17" name="Image 16">
-              <a:extLst>
-                <a:ext uri="{FF2B5EF4-FFF2-40B4-BE49-F238E27FC236}">
-                  <a16:creationId xmlns:a16="http://schemas.microsoft.com/office/drawing/2014/main" id="{3409A220-F20F-0577-B9D2-654AB41AF433}"/>
-                </a:ext>
-              </a:extLst>
-            </p:cNvPr>
-            <p:cNvPicPr>
-              <a:picLocks noChangeAspect="1"/>
-            </p:cNvPicPr>
-            <p:nvPr/>
-          </p:nvPicPr>
-          <p:blipFill>
-            <a:blip r:embed="rId3"/>
-            <a:stretch>
-              <a:fillRect/>
-            </a:stretch>
-          </p:blipFill>
-          <p:spPr>
-            <a:xfrm>
-              <a:off x="1467788" y="4395612"/>
-              <a:ext cx="800100" cy="666750"/>
-            </a:xfrm>
-            <a:prstGeom prst="rect">
-              <a:avLst/>
-            </a:prstGeom>
-          </p:spPr>
-        </p:pic>
       </p:grpSp>
-      <p:sp>
-        <p:nvSpPr>
-          <p:cNvPr id="2" name="Titre 1">
-            <a:extLst>
-              <a:ext uri="{FF2B5EF4-FFF2-40B4-BE49-F238E27FC236}">
-                <a16:creationId xmlns:a16="http://schemas.microsoft.com/office/drawing/2014/main" id="{099E2E77-954A-DD7C-99BF-B9521D1A2115}"/>
-              </a:ext>
-            </a:extLst>
-          </p:cNvPr>
-          <p:cNvSpPr>
-            <a:spLocks noGrp="1"/>
-          </p:cNvSpPr>
-          <p:nvPr>
-            <p:ph type="title"/>
-          </p:nvPr>
-        </p:nvSpPr>
-        <p:spPr>
-          <a:xfrm>
-            <a:off x="904875" y="909854"/>
-            <a:ext cx="3748148" cy="699027"/>
-          </a:xfrm>
-        </p:spPr>
-        <p:txBody>
-          <a:bodyPr vert="horz" lIns="91440" tIns="45720" rIns="91440" bIns="45720" rtlCol="0" anchor="b">
-            <a:normAutofit/>
-          </a:bodyPr>
-          <a:lstStyle/>
-          <a:p>
-            <a:r>
-              <a:rPr lang="en-US" sz="4000" dirty="0">
-                <a:gradFill flip="none" rotWithShape="1">
-                  <a:gsLst>
-                    <a:gs pos="0">
-                      <a:schemeClr val="accent5">
-                        <a:alpha val="70000"/>
-                      </a:schemeClr>
-                    </a:gs>
-                    <a:gs pos="100000">
-                      <a:schemeClr val="accent1">
-                        <a:alpha val="70000"/>
-                      </a:schemeClr>
-                    </a:gs>
-                  </a:gsLst>
-                  <a:lin ang="0" scaled="1"/>
-                  <a:tileRect/>
-                </a:gradFill>
-              </a:rPr>
-              <a:t>Focus front end</a:t>
-            </a:r>
-          </a:p>
-        </p:txBody>
-      </p:sp>
       <p:pic>
         <p:nvPicPr>
-          <p:cNvPr id="10" name="Image 9">
-            <a:extLst>
-              <a:ext uri="{FF2B5EF4-FFF2-40B4-BE49-F238E27FC236}">
-                <a16:creationId xmlns:a16="http://schemas.microsoft.com/office/drawing/2014/main" id="{F6416919-6B7B-FA36-6058-DBE3E048D2BB}"/>
+          <p:cNvPr id="4" name="Image 3">
+            <a:extLst>
+              <a:ext uri="{FF2B5EF4-FFF2-40B4-BE49-F238E27FC236}">
+                <a16:creationId xmlns:a16="http://schemas.microsoft.com/office/drawing/2014/main" id="{E96849FA-B3C0-3035-262D-41525D1A9B2C}"/>
               </a:ext>
             </a:extLst>
           </p:cNvPr>
@@ -11869,8 +12229,8 @@
         </p:blipFill>
         <p:spPr>
           <a:xfrm>
-            <a:off x="1448333" y="4387397"/>
-            <a:ext cx="2143125" cy="695325"/>
+            <a:off x="1418128" y="4170565"/>
+            <a:ext cx="2705100" cy="1171575"/>
           </a:xfrm>
           <a:prstGeom prst="rect">
             <a:avLst/>
@@ -11879,10 +12239,10 @@
       </p:pic>
       <p:pic>
         <p:nvPicPr>
-          <p:cNvPr id="22" name="Image 21">
-            <a:extLst>
-              <a:ext uri="{FF2B5EF4-FFF2-40B4-BE49-F238E27FC236}">
-                <a16:creationId xmlns:a16="http://schemas.microsoft.com/office/drawing/2014/main" id="{7DFC5104-42A8-6C93-E9F5-DCB97CA410D6}"/>
+          <p:cNvPr id="11" name="Image 10">
+            <a:extLst>
+              <a:ext uri="{FF2B5EF4-FFF2-40B4-BE49-F238E27FC236}">
+                <a16:creationId xmlns:a16="http://schemas.microsoft.com/office/drawing/2014/main" id="{9E470C15-FE6B-B290-F1A5-57DAABD25B95}"/>
               </a:ext>
             </a:extLst>
           </p:cNvPr>
@@ -11899,8 +12259,8 @@
         </p:blipFill>
         <p:spPr>
           <a:xfrm>
-            <a:off x="1446180" y="4375150"/>
-            <a:ext cx="2152650" cy="704850"/>
+            <a:off x="1433075" y="4174017"/>
+            <a:ext cx="2676525" cy="1162050"/>
           </a:xfrm>
           <a:prstGeom prst="rect">
             <a:avLst/>
@@ -11929,9 +12289,6 @@
                     <p:cTn id="3" fill="hold">
                       <p:stCondLst>
                         <p:cond delay="indefinite"/>
-                        <p:cond evt="onBegin" delay="0">
-                          <p:tn val="2"/>
-                        </p:cond>
                       </p:stCondLst>
                       <p:childTnLst>
                         <p:par>
@@ -11941,7 +12298,7 @@
                             </p:stCondLst>
                             <p:childTnLst>
                               <p:par>
-                                <p:cTn id="5" presetID="1" presetClass="entr" presetSubtype="0" fill="hold" nodeType="withEffect">
+                                <p:cTn id="5" presetID="1" presetClass="entr" presetSubtype="0" fill="hold" nodeType="clickEffect">
                                   <p:stCondLst>
                                     <p:cond delay="0"/>
                                   </p:stCondLst>
@@ -11954,7 +12311,7 @@
                                           </p:stCondLst>
                                         </p:cTn>
                                         <p:tgtEl>
-                                          <p:spTgt spid="18"/>
+                                          <p:spTgt spid="15"/>
                                         </p:tgtEl>
                                         <p:attrNameLst>
                                           <p:attrName>style.visibility</p:attrName>
@@ -11999,7 +12356,7 @@
                                           </p:stCondLst>
                                         </p:cTn>
                                         <p:tgtEl>
-                                          <p:spTgt spid="10"/>
+                                          <p:spTgt spid="4"/>
                                         </p:tgtEl>
                                         <p:attrNameLst>
                                           <p:attrName>style.visibility</p:attrName>
@@ -12044,7 +12401,7 @@
                                           </p:stCondLst>
                                         </p:cTn>
                                         <p:tgtEl>
-                                          <p:spTgt spid="22"/>
+                                          <p:spTgt spid="11"/>
                                         </p:tgtEl>
                                         <p:attrNameLst>
                                           <p:attrName>style.visibility</p:attrName>

</xml_diff>